<commit_message>
changes to course end
</commit_message>
<xml_diff>
--- a/6.Crypto/1.Full Course/10.HTTPS and TLS/Cryptology10-HTTPSandTLS.pptx
+++ b/6.Crypto/1.Full Course/10.HTTPS and TLS/Cryptology10-HTTPSandTLS.pptx
@@ -5,7 +5,7 @@
     <p:sldMasterId id="2147483648" r:id="rId1"/>
   </p:sldMasterIdLst>
   <p:notesMasterIdLst>
-    <p:notesMasterId r:id="rId17"/>
+    <p:notesMasterId r:id="rId19"/>
   </p:notesMasterIdLst>
   <p:sldIdLst>
     <p:sldId id="256" r:id="rId2"/>
@@ -14,15 +14,17 @@
     <p:sldId id="272" r:id="rId5"/>
     <p:sldId id="273" r:id="rId6"/>
     <p:sldId id="275" r:id="rId7"/>
-    <p:sldId id="274" r:id="rId8"/>
-    <p:sldId id="276" r:id="rId9"/>
-    <p:sldId id="277" r:id="rId10"/>
-    <p:sldId id="282" r:id="rId11"/>
-    <p:sldId id="278" r:id="rId12"/>
-    <p:sldId id="283" r:id="rId13"/>
-    <p:sldId id="279" r:id="rId14"/>
-    <p:sldId id="280" r:id="rId15"/>
-    <p:sldId id="281" r:id="rId16"/>
+    <p:sldId id="284" r:id="rId8"/>
+    <p:sldId id="274" r:id="rId9"/>
+    <p:sldId id="276" r:id="rId10"/>
+    <p:sldId id="277" r:id="rId11"/>
+    <p:sldId id="282" r:id="rId12"/>
+    <p:sldId id="278" r:id="rId13"/>
+    <p:sldId id="285" r:id="rId14"/>
+    <p:sldId id="279" r:id="rId15"/>
+    <p:sldId id="280" r:id="rId16"/>
+    <p:sldId id="286" r:id="rId17"/>
+    <p:sldId id="281" r:id="rId18"/>
   </p:sldIdLst>
   <p:sldSz cx="12192000" cy="6858000"/>
   <p:notesSz cx="6858000" cy="9144000"/>
@@ -214,7 +216,7 @@
           <a:p>
             <a:fld id="{0FBB2B09-09A1-420A-863F-C88E8594038B}" type="datetimeFigureOut">
               <a:rPr lang="en-US" smtClean="0"/>
-              <a:t>3/17/2023</a:t>
+              <a:t>3/20/2024</a:t>
             </a:fld>
             <a:endParaRPr lang="en-US"/>
           </a:p>
@@ -633,7 +635,7 @@
           <a:p>
             <a:fld id="{147646EF-9E77-4FEE-85B4-A24720C0DD53}" type="slidenum">
               <a:rPr lang="en-US" smtClean="0"/>
-              <a:t>10</a:t>
+              <a:t>11</a:t>
             </a:fld>
             <a:endParaRPr lang="en-US"/>
           </a:p>
@@ -720,7 +722,7 @@
           <a:p>
             <a:fld id="{147646EF-9E77-4FEE-85B4-A24720C0DD53}" type="slidenum">
               <a:rPr lang="en-US" smtClean="0"/>
-              <a:t>11</a:t>
+              <a:t>12</a:t>
             </a:fld>
             <a:endParaRPr lang="en-US"/>
           </a:p>
@@ -785,34 +787,53 @@
           <a:p>
             <a:r>
               <a:rPr lang="en-US" dirty="0"/>
-              <a:t>Unfortunately, it has become harder to monitor server certificates in TLS 1.3 since the certificate is now in the encrypted portion of the message.</a:t>
-            </a:r>
-          </a:p>
-          <a:p>
-            <a:endParaRPr lang="en-US" dirty="0"/>
-          </a:p>
-          <a:p>
-            <a:r>
-              <a:rPr lang="en-US" dirty="0"/>
-              <a:t>While TLS 1.2 is still in use, monitoring the server certificates is still a good method for gaining general information about the traffic.</a:t>
-            </a:r>
-          </a:p>
-          <a:p>
-            <a:endParaRPr lang="en-US" dirty="0"/>
-          </a:p>
-          <a:p>
-            <a:r>
-              <a:rPr lang="en-US" dirty="0"/>
-              <a:t>The most effective method for an organization to monitor its traffic is to require all web traffic to go through a proxy server, and to require all hosts in the organization to trust the certificate assigned to the proxy server.  Then the proxy server can decrypt the outbound traffic, examine it for malware, and then establish a new encrypted session with the destination.  This is essentially performing a Man in the Middle (MITM)  attack against your users, but is often necessary since so much malware uses encrypted communications.</a:t>
-            </a:r>
-          </a:p>
-          <a:p>
-            <a:endParaRPr lang="en-US" dirty="0"/>
-          </a:p>
-          <a:p>
-            <a:r>
-              <a:rPr lang="en-US" dirty="0"/>
-              <a:t>Using a proxy server or Next Generation Firewall (NGFW) can be expensive, however.  It takes powerful hardware to do all this decryption and encryption for a high bandwidth link.</a:t>
+              <a:t>This is an example from a TLS 1.2 handshake.  The TLS 1.3 handshake has been shortened, and I find the TLS 1.2 handshake easier to understand.  The essential components are present in both versions:</a:t>
+            </a:r>
+          </a:p>
+          <a:p>
+            <a:pPr marL="228600" indent="-228600">
+              <a:buFont typeface="+mj-lt"/>
+              <a:buAutoNum type="arabicPeriod"/>
+            </a:pPr>
+            <a:r>
+              <a:rPr lang="en-US" dirty="0"/>
+              <a:t>Agree on a cipher suite (in TLS 1.3, the client tries to guess what suite the server will prefer to shorten the process.)</a:t>
+            </a:r>
+          </a:p>
+          <a:p>
+            <a:pPr marL="228600" indent="-228600">
+              <a:buFont typeface="+mj-lt"/>
+              <a:buAutoNum type="arabicPeriod"/>
+            </a:pPr>
+            <a:r>
+              <a:rPr lang="en-US" dirty="0"/>
+              <a:t>Authenticate--verify that the server certificate is correct.  In some implementations the client also authenticates with its own certificate.  Certificates are often RSA, but versions of DSA and Diffie-Hellman are also used.</a:t>
+            </a:r>
+          </a:p>
+          <a:p>
+            <a:pPr marL="228600" indent="-228600">
+              <a:buFont typeface="+mj-lt"/>
+              <a:buAutoNum type="arabicPeriod"/>
+            </a:pPr>
+            <a:r>
+              <a:rPr lang="en-US" dirty="0"/>
+              <a:t>Exchange a key for symmetric encryption.  In TLS 1.3, this is usually done with a version of Diffie-Hellman.  In TLS 1.2, RSA is often used. </a:t>
+            </a:r>
+          </a:p>
+          <a:p>
+            <a:pPr marL="228600" indent="-228600">
+              <a:buFont typeface="+mj-lt"/>
+              <a:buAutoNum type="arabicPeriod"/>
+            </a:pPr>
+            <a:r>
+              <a:rPr lang="en-US" dirty="0"/>
+              <a:t>Switch to symmetric encryption.</a:t>
+            </a:r>
+          </a:p>
+          <a:p>
+            <a:r>
+              <a:rPr lang="en-US" dirty="0"/>
+              <a:t>Note that every packet in symmetric encryption is authenticated and integrity checked with a MAC, either GCM or by a separate computation like HMAC.  This detects corrupted packets and prevents adversaries from inserting packets in an attempt to break the encryption.  MACs use symmetric keys, which means we can no longer prove which side sent the packet (non-repudiation), but it is no longer necessary.  Non-repudiation was established at the beginning of the connection with digital certificates.  MAC is much faster, so is use the authenticate individual packets once the connection is established.</a:t>
             </a:r>
           </a:p>
         </p:txBody>
@@ -834,7 +855,7 @@
           <a:p>
             <a:fld id="{147646EF-9E77-4FEE-85B4-A24720C0DD53}" type="slidenum">
               <a:rPr lang="en-US" smtClean="0"/>
-              <a:t>12</a:t>
+              <a:t>14</a:t>
             </a:fld>
             <a:endParaRPr lang="en-US"/>
           </a:p>
@@ -843,7 +864,7 @@
     </p:spTree>
     <p:extLst>
       <p:ext uri="{BB962C8B-B14F-4D97-AF65-F5344CB8AC3E}">
-        <p14:creationId xmlns:p14="http://schemas.microsoft.com/office/powerpoint/2010/main" val="3434665665"/>
+        <p14:creationId xmlns:p14="http://schemas.microsoft.com/office/powerpoint/2010/main" val="2895959345"/>
       </p:ext>
     </p:extLst>
   </p:cSld>
@@ -899,7 +920,7 @@
           <a:p>
             <a:r>
               <a:rPr lang="en-US" dirty="0"/>
-              <a:t>This is an example from a TLS 1.2 handshake.  The TLS 1.3 handshake has been shortened, and I find the TLS 1.2 handshake easier to understand.  The essential components are present in both versions:</a:t>
+              <a:t>The browser performs several checks that we discussed in the last lesson.  Here is a partial list:</a:t>
             </a:r>
           </a:p>
           <a:p>
@@ -909,7 +930,7 @@
             </a:pPr>
             <a:r>
               <a:rPr lang="en-US" dirty="0"/>
-              <a:t>Agree on a cipher suite (in TLS 1.3, the client tries to guess what suite the server will prefer to shorten the process.)</a:t>
+              <a:t>The DNS name in the browser’s navigation bar must match the name in either the Subject (Common Name, or CN) or in one of the Subject Alternative Names (SANs)</a:t>
             </a:r>
           </a:p>
           <a:p>
@@ -919,7 +940,7 @@
             </a:pPr>
             <a:r>
               <a:rPr lang="en-US" dirty="0"/>
-              <a:t>Authenticate--verify that the server certificate is correct.  In some implementations the client also authenticates with its own certificate.  Certificates are often RSA, but versions of DSA and Diffie-Hellman are also used.</a:t>
+              <a:t>The certificate must be issued by a Certificate Authority (CA) that the browser or OS trusts.</a:t>
             </a:r>
           </a:p>
           <a:p>
@@ -929,7 +950,7 @@
             </a:pPr>
             <a:r>
               <a:rPr lang="en-US" dirty="0"/>
-              <a:t>Exchange a key for symmetric encryption.  In TLS 1.3, this is usually done with a version of Diffie-Hellman.  In TLS 1.2, RSA is often used. </a:t>
+              <a:t>The certificate must not be expired (the current date is within the validity dates on the certificate)</a:t>
             </a:r>
           </a:p>
           <a:p>
@@ -939,13 +960,20 @@
             </a:pPr>
             <a:r>
               <a:rPr lang="en-US" dirty="0"/>
-              <a:t>Switch to symmetric encryption.</a:t>
-            </a:r>
-          </a:p>
-          <a:p>
-            <a:r>
-              <a:rPr lang="en-US" dirty="0"/>
-              <a:t>Note that every packet in symmetric encryption is authenticated and integrity checked with a MAC, either GCM or by a separate computation like HMAC.  This detects corrupted packets and prevents adversaries from inserting packets in an attempt to break the encryption.  MACs use symmetric keys, which means we can no longer prove which side sent the packet (non-repudiation), but it is no longer necessary.  Non-repudiation was established at the beginning of the connection with digital certificates.  MAC is much faster, so is use the authenticate individual packets once the connection is established.</a:t>
+              <a:t>The certificate must use current protocols and hashes (certificates with SHA-1 hashes are disallowed, for example.)</a:t>
+            </a:r>
+          </a:p>
+          <a:p>
+            <a:pPr marL="228600" indent="-228600">
+              <a:buFont typeface="+mj-lt"/>
+              <a:buAutoNum type="arabicPeriod"/>
+            </a:pPr>
+            <a:endParaRPr lang="en-US" dirty="0"/>
+          </a:p>
+          <a:p>
+            <a:r>
+              <a:rPr lang="en-US" dirty="0"/>
+              <a:t>HTTP Strict Transport Security (HSTS) is designed to prevent a MITM attacker from intercepting your communications before your browser switches from HTTP to HTTPS (SSL-strip attack.)  If your browser has seen the desired site previously and the site uses the HSTS header, the browser has cached that information.  In later connections, the browser knows it is supposed to use HTTPS  and the valid certificate for that site.  It will not allow the user to click through warnings if the attacker tries to keep the connection or HTTP, or uses a forged certificate.</a:t>
             </a:r>
           </a:p>
         </p:txBody>
@@ -967,7 +995,7 @@
           <a:p>
             <a:fld id="{147646EF-9E77-4FEE-85B4-A24720C0DD53}" type="slidenum">
               <a:rPr lang="en-US" smtClean="0"/>
-              <a:t>13</a:t>
+              <a:t>15</a:t>
             </a:fld>
             <a:endParaRPr lang="en-US"/>
           </a:p>
@@ -976,7 +1004,7 @@
     </p:spTree>
     <p:extLst>
       <p:ext uri="{BB962C8B-B14F-4D97-AF65-F5344CB8AC3E}">
-        <p14:creationId xmlns:p14="http://schemas.microsoft.com/office/powerpoint/2010/main" val="2895959345"/>
+        <p14:creationId xmlns:p14="http://schemas.microsoft.com/office/powerpoint/2010/main" val="2520748376"/>
       </p:ext>
     </p:extLst>
   </p:cSld>
@@ -1032,146 +1060,6 @@
           <a:p>
             <a:r>
               <a:rPr lang="en-US" dirty="0"/>
-              <a:t>The browser performs several checks that we discussed in the last lesson.  Here is a partial list:</a:t>
-            </a:r>
-          </a:p>
-          <a:p>
-            <a:pPr marL="228600" indent="-228600">
-              <a:buFont typeface="+mj-lt"/>
-              <a:buAutoNum type="arabicPeriod"/>
-            </a:pPr>
-            <a:r>
-              <a:rPr lang="en-US" dirty="0"/>
-              <a:t>The DNS name in the browser’s navigation bar must match the name in either the Subject (Common Name, or CN) or in one of the Subject Alternative Names (SANs)</a:t>
-            </a:r>
-          </a:p>
-          <a:p>
-            <a:pPr marL="228600" indent="-228600">
-              <a:buFont typeface="+mj-lt"/>
-              <a:buAutoNum type="arabicPeriod"/>
-            </a:pPr>
-            <a:r>
-              <a:rPr lang="en-US" dirty="0"/>
-              <a:t>The certificate must be issued by a Certificate Authority (CA) that the browser or OS trusts.</a:t>
-            </a:r>
-          </a:p>
-          <a:p>
-            <a:pPr marL="228600" indent="-228600">
-              <a:buFont typeface="+mj-lt"/>
-              <a:buAutoNum type="arabicPeriod"/>
-            </a:pPr>
-            <a:r>
-              <a:rPr lang="en-US" dirty="0"/>
-              <a:t>The certificate must not be expired (the current date is within the validity dates on the certificate)</a:t>
-            </a:r>
-          </a:p>
-          <a:p>
-            <a:pPr marL="228600" indent="-228600">
-              <a:buFont typeface="+mj-lt"/>
-              <a:buAutoNum type="arabicPeriod"/>
-            </a:pPr>
-            <a:r>
-              <a:rPr lang="en-US" dirty="0"/>
-              <a:t>The certificate must use current protocols and hashes (certificates with SHA-1 hashes are disallowed, for example.)</a:t>
-            </a:r>
-          </a:p>
-          <a:p>
-            <a:pPr marL="228600" indent="-228600">
-              <a:buFont typeface="+mj-lt"/>
-              <a:buAutoNum type="arabicPeriod"/>
-            </a:pPr>
-            <a:endParaRPr lang="en-US" dirty="0"/>
-          </a:p>
-          <a:p>
-            <a:r>
-              <a:rPr lang="en-US" dirty="0"/>
-              <a:t>HTTP Strict Transport Security (HSTS) is designed to prevent a MITM attacker from intercepting your communications before your browser switches from HTTP to HTTPS (SSL-strip attack.)  If your browser has seen the desired site previously and the site uses the HSTS header, the browser has cached that information.  In later connections, the browser knows it is supposed to use HTTPS  and the valid certificate for that site.  It will not allow the user to click through warnings if the attacker tries to keep the connection or HTTP, or uses a forged certificate.</a:t>
-            </a:r>
-          </a:p>
-        </p:txBody>
-      </p:sp>
-      <p:sp>
-        <p:nvSpPr>
-          <p:cNvPr id="4" name="Slide Number Placeholder 3"/>
-          <p:cNvSpPr>
-            <a:spLocks noGrp="1"/>
-          </p:cNvSpPr>
-          <p:nvPr>
-            <p:ph type="sldNum" sz="quarter" idx="5"/>
-          </p:nvPr>
-        </p:nvSpPr>
-        <p:spPr/>
-        <p:txBody>
-          <a:bodyPr/>
-          <a:lstStyle/>
-          <a:p>
-            <a:fld id="{147646EF-9E77-4FEE-85B4-A24720C0DD53}" type="slidenum">
-              <a:rPr lang="en-US" smtClean="0"/>
-              <a:t>14</a:t>
-            </a:fld>
-            <a:endParaRPr lang="en-US"/>
-          </a:p>
-        </p:txBody>
-      </p:sp>
-    </p:spTree>
-    <p:extLst>
-      <p:ext uri="{BB962C8B-B14F-4D97-AF65-F5344CB8AC3E}">
-        <p14:creationId xmlns:p14="http://schemas.microsoft.com/office/powerpoint/2010/main" val="2520748376"/>
-      </p:ext>
-    </p:extLst>
-  </p:cSld>
-  <p:clrMapOvr>
-    <a:masterClrMapping/>
-  </p:clrMapOvr>
-</p:notes>
-</file>
-
-<file path=ppt/notesSlides/notesSlide15.xml><?xml version="1.0" encoding="utf-8"?>
-<p:notes xmlns:a="http://schemas.openxmlformats.org/drawingml/2006/main" xmlns:r="http://schemas.openxmlformats.org/officeDocument/2006/relationships" xmlns:p="http://schemas.openxmlformats.org/presentationml/2006/main">
-  <p:cSld>
-    <p:spTree>
-      <p:nvGrpSpPr>
-        <p:cNvPr id="1" name=""/>
-        <p:cNvGrpSpPr/>
-        <p:nvPr/>
-      </p:nvGrpSpPr>
-      <p:grpSpPr>
-        <a:xfrm>
-          <a:off x="0" y="0"/>
-          <a:ext cx="0" cy="0"/>
-          <a:chOff x="0" y="0"/>
-          <a:chExt cx="0" cy="0"/>
-        </a:xfrm>
-      </p:grpSpPr>
-      <p:sp>
-        <p:nvSpPr>
-          <p:cNvPr id="2" name="Slide Image Placeholder 1"/>
-          <p:cNvSpPr>
-            <a:spLocks noGrp="1" noRot="1" noChangeAspect="1"/>
-          </p:cNvSpPr>
-          <p:nvPr>
-            <p:ph type="sldImg"/>
-          </p:nvPr>
-        </p:nvSpPr>
-        <p:spPr/>
-      </p:sp>
-      <p:sp>
-        <p:nvSpPr>
-          <p:cNvPr id="3" name="Notes Placeholder 2"/>
-          <p:cNvSpPr>
-            <a:spLocks noGrp="1"/>
-          </p:cNvSpPr>
-          <p:nvPr>
-            <p:ph type="body" idx="1"/>
-          </p:nvPr>
-        </p:nvSpPr>
-        <p:spPr/>
-        <p:txBody>
-          <a:bodyPr/>
-          <a:lstStyle/>
-          <a:p>
-            <a:r>
-              <a:rPr lang="en-US" dirty="0"/>
               <a:t>In RSA, the server’s private key is used to create the session key that will be used for the rest of the connection (asymmetric, AES for example.)  If the network traffic is recorded, anyone who has the server’s private key can recreate the session key and decrypt both sides of the traffic.</a:t>
             </a:r>
           </a:p>
@@ -1222,7 +1110,7 @@
           <a:p>
             <a:fld id="{147646EF-9E77-4FEE-85B4-A24720C0DD53}" type="slidenum">
               <a:rPr lang="en-US" smtClean="0"/>
-              <a:t>15</a:t>
+              <a:t>17</a:t>
             </a:fld>
             <a:endParaRPr lang="en-US"/>
           </a:p>
@@ -1971,7 +1859,7 @@
           <a:p>
             <a:fld id="{147646EF-9E77-4FEE-85B4-A24720C0DD53}" type="slidenum">
               <a:rPr lang="en-US" smtClean="0"/>
-              <a:t>7</a:t>
+              <a:t>8</a:t>
             </a:fld>
             <a:endParaRPr lang="en-US"/>
           </a:p>
@@ -2119,7 +2007,7 @@
           <a:p>
             <a:fld id="{147646EF-9E77-4FEE-85B4-A24720C0DD53}" type="slidenum">
               <a:rPr lang="en-US" smtClean="0"/>
-              <a:t>8</a:t>
+              <a:t>9</a:t>
             </a:fld>
             <a:endParaRPr lang="en-US"/>
           </a:p>
@@ -2203,7 +2091,7 @@
           <a:p>
             <a:fld id="{147646EF-9E77-4FEE-85B4-A24720C0DD53}" type="slidenum">
               <a:rPr lang="en-US" smtClean="0"/>
-              <a:t>9</a:t>
+              <a:t>10</a:t>
             </a:fld>
             <a:endParaRPr lang="en-US"/>
           </a:p>
@@ -2369,7 +2257,7 @@
           <a:p>
             <a:fld id="{1451AC46-F7BF-44D3-9ECB-7DDAC9A69083}" type="datetimeFigureOut">
               <a:rPr lang="en-US" smtClean="0"/>
-              <a:t>3/17/2023</a:t>
+              <a:t>3/20/2024</a:t>
             </a:fld>
             <a:endParaRPr lang="en-US"/>
           </a:p>
@@ -2567,7 +2455,7 @@
           <a:p>
             <a:fld id="{1451AC46-F7BF-44D3-9ECB-7DDAC9A69083}" type="datetimeFigureOut">
               <a:rPr lang="en-US" smtClean="0"/>
-              <a:t>3/17/2023</a:t>
+              <a:t>3/20/2024</a:t>
             </a:fld>
             <a:endParaRPr lang="en-US"/>
           </a:p>
@@ -2775,7 +2663,7 @@
           <a:p>
             <a:fld id="{1451AC46-F7BF-44D3-9ECB-7DDAC9A69083}" type="datetimeFigureOut">
               <a:rPr lang="en-US" smtClean="0"/>
-              <a:t>3/17/2023</a:t>
+              <a:t>3/20/2024</a:t>
             </a:fld>
             <a:endParaRPr lang="en-US"/>
           </a:p>
@@ -2973,7 +2861,7 @@
           <a:p>
             <a:fld id="{1451AC46-F7BF-44D3-9ECB-7DDAC9A69083}" type="datetimeFigureOut">
               <a:rPr lang="en-US" smtClean="0"/>
-              <a:t>3/17/2023</a:t>
+              <a:t>3/20/2024</a:t>
             </a:fld>
             <a:endParaRPr lang="en-US"/>
           </a:p>
@@ -3248,7 +3136,7 @@
           <a:p>
             <a:fld id="{1451AC46-F7BF-44D3-9ECB-7DDAC9A69083}" type="datetimeFigureOut">
               <a:rPr lang="en-US" smtClean="0"/>
-              <a:t>3/17/2023</a:t>
+              <a:t>3/20/2024</a:t>
             </a:fld>
             <a:endParaRPr lang="en-US"/>
           </a:p>
@@ -3513,7 +3401,7 @@
           <a:p>
             <a:fld id="{1451AC46-F7BF-44D3-9ECB-7DDAC9A69083}" type="datetimeFigureOut">
               <a:rPr lang="en-US" smtClean="0"/>
-              <a:t>3/17/2023</a:t>
+              <a:t>3/20/2024</a:t>
             </a:fld>
             <a:endParaRPr lang="en-US"/>
           </a:p>
@@ -3925,7 +3813,7 @@
           <a:p>
             <a:fld id="{1451AC46-F7BF-44D3-9ECB-7DDAC9A69083}" type="datetimeFigureOut">
               <a:rPr lang="en-US" smtClean="0"/>
-              <a:t>3/17/2023</a:t>
+              <a:t>3/20/2024</a:t>
             </a:fld>
             <a:endParaRPr lang="en-US"/>
           </a:p>
@@ -4066,7 +3954,7 @@
           <a:p>
             <a:fld id="{1451AC46-F7BF-44D3-9ECB-7DDAC9A69083}" type="datetimeFigureOut">
               <a:rPr lang="en-US" smtClean="0"/>
-              <a:t>3/17/2023</a:t>
+              <a:t>3/20/2024</a:t>
             </a:fld>
             <a:endParaRPr lang="en-US"/>
           </a:p>
@@ -4179,7 +4067,7 @@
           <a:p>
             <a:fld id="{1451AC46-F7BF-44D3-9ECB-7DDAC9A69083}" type="datetimeFigureOut">
               <a:rPr lang="en-US" smtClean="0"/>
-              <a:t>3/17/2023</a:t>
+              <a:t>3/20/2024</a:t>
             </a:fld>
             <a:endParaRPr lang="en-US"/>
           </a:p>
@@ -4490,7 +4378,7 @@
           <a:p>
             <a:fld id="{1451AC46-F7BF-44D3-9ECB-7DDAC9A69083}" type="datetimeFigureOut">
               <a:rPr lang="en-US" smtClean="0"/>
-              <a:t>3/17/2023</a:t>
+              <a:t>3/20/2024</a:t>
             </a:fld>
             <a:endParaRPr lang="en-US"/>
           </a:p>
@@ -4778,7 +4666,7 @@
           <a:p>
             <a:fld id="{1451AC46-F7BF-44D3-9ECB-7DDAC9A69083}" type="datetimeFigureOut">
               <a:rPr lang="en-US" smtClean="0"/>
-              <a:t>3/17/2023</a:t>
+              <a:t>3/20/2024</a:t>
             </a:fld>
             <a:endParaRPr lang="en-US"/>
           </a:p>
@@ -5019,7 +4907,7 @@
           <a:p>
             <a:fld id="{1451AC46-F7BF-44D3-9ECB-7DDAC9A69083}" type="datetimeFigureOut">
               <a:rPr lang="en-US" smtClean="0"/>
-              <a:t>3/17/2023</a:t>
+              <a:t>3/20/2024</a:t>
             </a:fld>
             <a:endParaRPr lang="en-US"/>
           </a:p>
@@ -5547,6 +5435,148 @@
           <p:cNvPr id="2" name="Title 1">
             <a:extLst>
               <a:ext uri="{FF2B5EF4-FFF2-40B4-BE49-F238E27FC236}">
+                <a16:creationId xmlns:a16="http://schemas.microsoft.com/office/drawing/2014/main" id="{97EF0793-1FC4-4FB5-9C9C-8766CE03D148}"/>
+              </a:ext>
+            </a:extLst>
+          </p:cNvPr>
+          <p:cNvSpPr>
+            <a:spLocks noGrp="1"/>
+          </p:cNvSpPr>
+          <p:nvPr>
+            <p:ph type="title"/>
+          </p:nvPr>
+        </p:nvSpPr>
+        <p:spPr/>
+        <p:txBody>
+          <a:bodyPr/>
+          <a:lstStyle/>
+          <a:p>
+            <a:r>
+              <a:rPr lang="en-US" dirty="0"/>
+              <a:t>TLS example—Server Hello</a:t>
+            </a:r>
+          </a:p>
+        </p:txBody>
+      </p:sp>
+      <p:pic>
+        <p:nvPicPr>
+          <p:cNvPr id="4" name="Picture 3">
+            <a:extLst>
+              <a:ext uri="{FF2B5EF4-FFF2-40B4-BE49-F238E27FC236}">
+                <a16:creationId xmlns:a16="http://schemas.microsoft.com/office/drawing/2014/main" id="{2005AD58-CB67-4473-A0E2-2C49C7E38D92}"/>
+              </a:ext>
+            </a:extLst>
+          </p:cNvPr>
+          <p:cNvPicPr>
+            <a:picLocks noChangeAspect="1"/>
+          </p:cNvPicPr>
+          <p:nvPr/>
+        </p:nvPicPr>
+        <p:blipFill>
+          <a:blip r:embed="rId3"/>
+          <a:stretch>
+            <a:fillRect/>
+          </a:stretch>
+        </p:blipFill>
+        <p:spPr>
+          <a:xfrm>
+            <a:off x="681099" y="1502105"/>
+            <a:ext cx="8953500" cy="4210050"/>
+          </a:xfrm>
+          <a:prstGeom prst="rect">
+            <a:avLst/>
+          </a:prstGeom>
+        </p:spPr>
+      </p:pic>
+      <p:sp>
+        <p:nvSpPr>
+          <p:cNvPr id="3" name="Content Placeholder 2">
+            <a:extLst>
+              <a:ext uri="{FF2B5EF4-FFF2-40B4-BE49-F238E27FC236}">
+                <a16:creationId xmlns:a16="http://schemas.microsoft.com/office/drawing/2014/main" id="{27B328AF-6BB4-495A-B113-ABE22E3E41E6}"/>
+              </a:ext>
+            </a:extLst>
+          </p:cNvPr>
+          <p:cNvSpPr>
+            <a:spLocks noGrp="1"/>
+          </p:cNvSpPr>
+          <p:nvPr>
+            <p:ph idx="1"/>
+          </p:nvPr>
+        </p:nvSpPr>
+        <p:spPr>
+          <a:xfrm>
+            <a:off x="6096000" y="3236854"/>
+            <a:ext cx="3824845" cy="2475301"/>
+          </a:xfrm>
+          <a:solidFill>
+            <a:schemeClr val="bg1"/>
+          </a:solidFill>
+        </p:spPr>
+        <p:txBody>
+          <a:bodyPr>
+            <a:normAutofit lnSpcReduction="10000"/>
+          </a:bodyPr>
+          <a:lstStyle/>
+          <a:p>
+            <a:r>
+              <a:rPr lang="en-US" dirty="0"/>
+              <a:t>Server selects Cipher Suite</a:t>
+            </a:r>
+          </a:p>
+          <a:p>
+            <a:r>
+              <a:rPr lang="en-US" dirty="0"/>
+              <a:t>Includes a random number so key material is always different</a:t>
+            </a:r>
+          </a:p>
+          <a:p>
+            <a:pPr lvl="1"/>
+            <a:r>
+              <a:rPr lang="en-US" dirty="0"/>
+              <a:t>Think nonce or IV</a:t>
+            </a:r>
+          </a:p>
+          <a:p>
+            <a:endParaRPr lang="en-US" dirty="0"/>
+          </a:p>
+        </p:txBody>
+      </p:sp>
+    </p:spTree>
+    <p:extLst>
+      <p:ext uri="{BB962C8B-B14F-4D97-AF65-F5344CB8AC3E}">
+        <p14:creationId xmlns:p14="http://schemas.microsoft.com/office/powerpoint/2010/main" val="4279263951"/>
+      </p:ext>
+    </p:extLst>
+  </p:cSld>
+  <p:clrMapOvr>
+    <a:masterClrMapping/>
+  </p:clrMapOvr>
+</p:sld>
+</file>
+
+<file path=ppt/slides/slide11.xml><?xml version="1.0" encoding="utf-8"?>
+<p:sld xmlns:a="http://schemas.openxmlformats.org/drawingml/2006/main" xmlns:r="http://schemas.openxmlformats.org/officeDocument/2006/relationships" xmlns:p="http://schemas.openxmlformats.org/presentationml/2006/main">
+  <p:cSld>
+    <p:spTree>
+      <p:nvGrpSpPr>
+        <p:cNvPr id="1" name=""/>
+        <p:cNvGrpSpPr/>
+        <p:nvPr/>
+      </p:nvGrpSpPr>
+      <p:grpSpPr>
+        <a:xfrm>
+          <a:off x="0" y="0"/>
+          <a:ext cx="0" cy="0"/>
+          <a:chOff x="0" y="0"/>
+          <a:chExt cx="0" cy="0"/>
+        </a:xfrm>
+      </p:grpSpPr>
+      <p:sp>
+        <p:nvSpPr>
+          <p:cNvPr id="2" name="Title 1">
+            <a:extLst>
+              <a:ext uri="{FF2B5EF4-FFF2-40B4-BE49-F238E27FC236}">
                 <a16:creationId xmlns:a16="http://schemas.microsoft.com/office/drawing/2014/main" id="{6AA32D22-15EE-4B67-96AD-9F56C7559635}"/>
               </a:ext>
             </a:extLst>
@@ -5606,13 +5636,13 @@
           <a:p>
             <a:r>
               <a:rPr lang="en-US" dirty="0"/>
-              <a:t>Key exchange—ECDHE, Elliptic Curve Diffie-Hellman Exchange</a:t>
-            </a:r>
-          </a:p>
-          <a:p>
-            <a:r>
-              <a:rPr lang="en-US" dirty="0"/>
-              <a:t>Certificate—RSA</a:t>
+              <a:t>Key exchange—ECDHE, Elliptic Curve Diffie-Hellman Ephemeral</a:t>
+            </a:r>
+          </a:p>
+          <a:p>
+            <a:r>
+              <a:rPr lang="en-US" dirty="0"/>
+              <a:t>Certificate/authentication—RSA</a:t>
             </a:r>
           </a:p>
           <a:p>
@@ -5625,7 +5655,7 @@
             <a:pPr lvl="1"/>
             <a:r>
               <a:rPr lang="en-US" dirty="0"/>
-              <a:t>GCM includes authenticity checking</a:t>
+              <a:t>GCM includes authenticity checking (tag or MAC)</a:t>
             </a:r>
           </a:p>
           <a:p>
@@ -5637,7 +5667,7 @@
           <a:p>
             <a:r>
               <a:rPr lang="en-US" dirty="0"/>
-              <a:t>Note:  the random number is used for Diffie-Hellman key generation</a:t>
+              <a:t>Random number is used for key generation, think nonce or IV</a:t>
             </a:r>
           </a:p>
         </p:txBody>
@@ -5684,7 +5714,7 @@
 </p:sld>
 </file>
 
-<file path=ppt/slides/slide11.xml><?xml version="1.0" encoding="utf-8"?>
+<file path=ppt/slides/slide12.xml><?xml version="1.0" encoding="utf-8"?>
 <p:sld xmlns:a="http://schemas.openxmlformats.org/drawingml/2006/main" xmlns:r="http://schemas.openxmlformats.org/officeDocument/2006/relationships" xmlns:p="http://schemas.openxmlformats.org/presentationml/2006/main">
   <p:cSld>
     <p:spTree>
@@ -5777,7 +5807,7 @@
         </p:nvSpPr>
         <p:spPr>
           <a:xfrm>
-            <a:off x="7517080" y="3429000"/>
+            <a:off x="7477892" y="3063240"/>
             <a:ext cx="3979223" cy="2507488"/>
           </a:xfrm>
         </p:spPr>
@@ -5795,7 +5825,7 @@
             </a:r>
             <a:r>
               <a:rPr lang="en-US" dirty="0"/>
-              <a:t>(Key Exchange and Done messages also included)</a:t>
+              <a:t>(Key Exchange and Done messages also included) in this packet</a:t>
             </a:r>
           </a:p>
         </p:txBody>
@@ -5804,118 +5834,6 @@
     <p:extLst>
       <p:ext uri="{BB962C8B-B14F-4D97-AF65-F5344CB8AC3E}">
         <p14:creationId xmlns:p14="http://schemas.microsoft.com/office/powerpoint/2010/main" val="3294739671"/>
-      </p:ext>
-    </p:extLst>
-  </p:cSld>
-  <p:clrMapOvr>
-    <a:masterClrMapping/>
-  </p:clrMapOvr>
-</p:sld>
-</file>
-
-<file path=ppt/slides/slide12.xml><?xml version="1.0" encoding="utf-8"?>
-<p:sld xmlns:a="http://schemas.openxmlformats.org/drawingml/2006/main" xmlns:r="http://schemas.openxmlformats.org/officeDocument/2006/relationships" xmlns:p="http://schemas.openxmlformats.org/presentationml/2006/main">
-  <p:cSld>
-    <p:spTree>
-      <p:nvGrpSpPr>
-        <p:cNvPr id="1" name=""/>
-        <p:cNvGrpSpPr/>
-        <p:nvPr/>
-      </p:nvGrpSpPr>
-      <p:grpSpPr>
-        <a:xfrm>
-          <a:off x="0" y="0"/>
-          <a:ext cx="0" cy="0"/>
-          <a:chOff x="0" y="0"/>
-          <a:chExt cx="0" cy="0"/>
-        </a:xfrm>
-      </p:grpSpPr>
-      <p:sp>
-        <p:nvSpPr>
-          <p:cNvPr id="2" name="Title 1">
-            <a:extLst>
-              <a:ext uri="{FF2B5EF4-FFF2-40B4-BE49-F238E27FC236}">
-                <a16:creationId xmlns:a16="http://schemas.microsoft.com/office/drawing/2014/main" id="{672753B5-E54D-42F7-8CC5-649AAA732BB8}"/>
-              </a:ext>
-            </a:extLst>
-          </p:cNvPr>
-          <p:cNvSpPr>
-            <a:spLocks noGrp="1"/>
-          </p:cNvSpPr>
-          <p:nvPr>
-            <p:ph type="title"/>
-          </p:nvPr>
-        </p:nvSpPr>
-        <p:spPr/>
-        <p:txBody>
-          <a:bodyPr/>
-          <a:lstStyle/>
-          <a:p>
-            <a:r>
-              <a:rPr lang="en-US" dirty="0"/>
-              <a:t>Server certificate is important</a:t>
-            </a:r>
-          </a:p>
-        </p:txBody>
-      </p:sp>
-      <p:sp>
-        <p:nvSpPr>
-          <p:cNvPr id="3" name="Content Placeholder 2">
-            <a:extLst>
-              <a:ext uri="{FF2B5EF4-FFF2-40B4-BE49-F238E27FC236}">
-                <a16:creationId xmlns:a16="http://schemas.microsoft.com/office/drawing/2014/main" id="{FC9E8F07-8053-4515-A8E4-4D872333885B}"/>
-              </a:ext>
-            </a:extLst>
-          </p:cNvPr>
-          <p:cNvSpPr>
-            <a:spLocks noGrp="1"/>
-          </p:cNvSpPr>
-          <p:nvPr>
-            <p:ph idx="1"/>
-          </p:nvPr>
-        </p:nvSpPr>
-        <p:spPr/>
-        <p:txBody>
-          <a:bodyPr/>
-          <a:lstStyle/>
-          <a:p>
-            <a:r>
-              <a:rPr lang="en-US" dirty="0"/>
-              <a:t>Most traffic is now encrypted and cannot normally be examined by Intrusion Prevention System</a:t>
-            </a:r>
-          </a:p>
-          <a:p>
-            <a:pPr lvl="1"/>
-            <a:r>
-              <a:rPr lang="en-US" dirty="0"/>
-              <a:t>Traffic with RSA encryption may be examined if server private key is known</a:t>
-            </a:r>
-          </a:p>
-          <a:p>
-            <a:pPr lvl="1"/>
-            <a:r>
-              <a:rPr lang="en-US" dirty="0"/>
-              <a:t>Diffie Hellman Encryption monitoring requires proxy and friendly Man in the Middle attack (MITM), or for the browser to save the keys as it goes</a:t>
-            </a:r>
-          </a:p>
-          <a:p>
-            <a:r>
-              <a:rPr lang="en-US" dirty="0"/>
-              <a:t>Server certificate is a good indication of use</a:t>
-            </a:r>
-          </a:p>
-          <a:p>
-            <a:r>
-              <a:rPr lang="en-US" dirty="0"/>
-              <a:t>Examining server certificates may be very useful in detecting malicious traffic</a:t>
-            </a:r>
-          </a:p>
-        </p:txBody>
-      </p:sp>
-    </p:spTree>
-    <p:extLst>
-      <p:ext uri="{BB962C8B-B14F-4D97-AF65-F5344CB8AC3E}">
-        <p14:creationId xmlns:p14="http://schemas.microsoft.com/office/powerpoint/2010/main" val="2889804229"/>
       </p:ext>
     </p:extLst>
   </p:cSld>
@@ -5947,6 +5865,135 @@
           <p:cNvPr id="2" name="Title 1">
             <a:extLst>
               <a:ext uri="{FF2B5EF4-FFF2-40B4-BE49-F238E27FC236}">
+                <a16:creationId xmlns:a16="http://schemas.microsoft.com/office/drawing/2014/main" id="{388A99DF-ADD7-3A96-0183-08065152BAAF}"/>
+              </a:ext>
+            </a:extLst>
+          </p:cNvPr>
+          <p:cNvSpPr>
+            <a:spLocks noGrp="1"/>
+          </p:cNvSpPr>
+          <p:nvPr>
+            <p:ph type="title"/>
+          </p:nvPr>
+        </p:nvSpPr>
+        <p:spPr/>
+        <p:txBody>
+          <a:bodyPr/>
+          <a:lstStyle/>
+          <a:p>
+            <a:r>
+              <a:rPr lang="en-US" dirty="0"/>
+              <a:t>TLS Example – Server Key Exchange</a:t>
+            </a:r>
+          </a:p>
+        </p:txBody>
+      </p:sp>
+      <p:sp>
+        <p:nvSpPr>
+          <p:cNvPr id="3" name="Content Placeholder 2">
+            <a:extLst>
+              <a:ext uri="{FF2B5EF4-FFF2-40B4-BE49-F238E27FC236}">
+                <a16:creationId xmlns:a16="http://schemas.microsoft.com/office/drawing/2014/main" id="{031890F4-2535-1E6A-94E9-8EBD752E4873}"/>
+              </a:ext>
+            </a:extLst>
+          </p:cNvPr>
+          <p:cNvSpPr>
+            <a:spLocks noGrp="1"/>
+          </p:cNvSpPr>
+          <p:nvPr>
+            <p:ph idx="1"/>
+          </p:nvPr>
+        </p:nvSpPr>
+        <p:spPr>
+          <a:xfrm>
+            <a:off x="953588" y="5042263"/>
+            <a:ext cx="10400211" cy="1134699"/>
+          </a:xfrm>
+        </p:spPr>
+        <p:txBody>
+          <a:bodyPr>
+            <a:normAutofit fontScale="92500" lnSpcReduction="20000"/>
+          </a:bodyPr>
+          <a:lstStyle/>
+          <a:p>
+            <a:r>
+              <a:rPr lang="en-US" dirty="0"/>
+              <a:t>Contains ECDHKE curve and public key for DH</a:t>
+            </a:r>
+          </a:p>
+          <a:p>
+            <a:r>
+              <a:rPr lang="en-US" dirty="0"/>
+              <a:t>Also contains a hash of previous info, signed with private key from digital cert</a:t>
+            </a:r>
+          </a:p>
+        </p:txBody>
+      </p:sp>
+      <p:pic>
+        <p:nvPicPr>
+          <p:cNvPr id="5" name="Picture 4">
+            <a:extLst>
+              <a:ext uri="{FF2B5EF4-FFF2-40B4-BE49-F238E27FC236}">
+                <a16:creationId xmlns:a16="http://schemas.microsoft.com/office/drawing/2014/main" id="{1C5D238B-91CD-3838-7366-1582482AA0A7}"/>
+              </a:ext>
+            </a:extLst>
+          </p:cNvPr>
+          <p:cNvPicPr>
+            <a:picLocks noChangeAspect="1"/>
+          </p:cNvPicPr>
+          <p:nvPr/>
+        </p:nvPicPr>
+        <p:blipFill>
+          <a:blip r:embed="rId2"/>
+          <a:stretch>
+            <a:fillRect/>
+          </a:stretch>
+        </p:blipFill>
+        <p:spPr>
+          <a:xfrm>
+            <a:off x="682332" y="1480826"/>
+            <a:ext cx="10556080" cy="3383359"/>
+          </a:xfrm>
+          <a:prstGeom prst="rect">
+            <a:avLst/>
+          </a:prstGeom>
+        </p:spPr>
+      </p:pic>
+    </p:spTree>
+    <p:extLst>
+      <p:ext uri="{BB962C8B-B14F-4D97-AF65-F5344CB8AC3E}">
+        <p14:creationId xmlns:p14="http://schemas.microsoft.com/office/powerpoint/2010/main" val="1018052264"/>
+      </p:ext>
+    </p:extLst>
+  </p:cSld>
+  <p:clrMapOvr>
+    <a:masterClrMapping/>
+  </p:clrMapOvr>
+</p:sld>
+</file>
+
+<file path=ppt/slides/slide14.xml><?xml version="1.0" encoding="utf-8"?>
+<p:sld xmlns:a="http://schemas.openxmlformats.org/drawingml/2006/main" xmlns:r="http://schemas.openxmlformats.org/officeDocument/2006/relationships" xmlns:p="http://schemas.openxmlformats.org/presentationml/2006/main">
+  <p:cSld>
+    <p:spTree>
+      <p:nvGrpSpPr>
+        <p:cNvPr id="1" name=""/>
+        <p:cNvGrpSpPr/>
+        <p:nvPr/>
+      </p:nvGrpSpPr>
+      <p:grpSpPr>
+        <a:xfrm>
+          <a:off x="0" y="0"/>
+          <a:ext cx="0" cy="0"/>
+          <a:chOff x="0" y="0"/>
+          <a:chExt cx="0" cy="0"/>
+        </a:xfrm>
+      </p:grpSpPr>
+      <p:sp>
+        <p:nvSpPr>
+          <p:cNvPr id="2" name="Title 1">
+            <a:extLst>
+              <a:ext uri="{FF2B5EF4-FFF2-40B4-BE49-F238E27FC236}">
                 <a16:creationId xmlns:a16="http://schemas.microsoft.com/office/drawing/2014/main" id="{8D160BEC-308B-41B1-AF36-1267D959CA00}"/>
               </a:ext>
             </a:extLst>
@@ -6055,7 +6102,7 @@
 </p:sld>
 </file>
 
-<file path=ppt/slides/slide14.xml><?xml version="1.0" encoding="utf-8"?>
+<file path=ppt/slides/slide15.xml><?xml version="1.0" encoding="utf-8"?>
 <p:sld xmlns:a="http://schemas.openxmlformats.org/drawingml/2006/main" xmlns:r="http://schemas.openxmlformats.org/officeDocument/2006/relationships" xmlns:p="http://schemas.openxmlformats.org/presentationml/2006/main">
   <p:cSld>
     <p:spTree>
@@ -6202,7 +6249,7 @@
 </p:sld>
 </file>
 
-<file path=ppt/slides/slide15.xml><?xml version="1.0" encoding="utf-8"?>
+<file path=ppt/slides/slide16.xml><?xml version="1.0" encoding="utf-8"?>
 <p:sld xmlns:a="http://schemas.openxmlformats.org/drawingml/2006/main" xmlns:r="http://schemas.openxmlformats.org/officeDocument/2006/relationships" xmlns:p="http://schemas.openxmlformats.org/presentationml/2006/main">
   <p:cSld>
     <p:spTree>
@@ -6224,6 +6271,141 @@
           <p:cNvPr id="2" name="Title 1">
             <a:extLst>
               <a:ext uri="{FF2B5EF4-FFF2-40B4-BE49-F238E27FC236}">
+                <a16:creationId xmlns:a16="http://schemas.microsoft.com/office/drawing/2014/main" id="{2DE7EE6F-74ED-F348-724F-7FD4A219B738}"/>
+              </a:ext>
+            </a:extLst>
+          </p:cNvPr>
+          <p:cNvSpPr>
+            <a:spLocks noGrp="1"/>
+          </p:cNvSpPr>
+          <p:nvPr>
+            <p:ph type="title"/>
+          </p:nvPr>
+        </p:nvSpPr>
+        <p:spPr/>
+        <p:txBody>
+          <a:bodyPr/>
+          <a:lstStyle/>
+          <a:p>
+            <a:r>
+              <a:rPr lang="en-US" dirty="0"/>
+              <a:t>Main Changes in TLS 1.3</a:t>
+            </a:r>
+          </a:p>
+        </p:txBody>
+      </p:sp>
+      <p:sp>
+        <p:nvSpPr>
+          <p:cNvPr id="3" name="Content Placeholder 2">
+            <a:extLst>
+              <a:ext uri="{FF2B5EF4-FFF2-40B4-BE49-F238E27FC236}">
+                <a16:creationId xmlns:a16="http://schemas.microsoft.com/office/drawing/2014/main" id="{BCD6C5FB-FDE5-D969-EF78-E9AAAFC46DEC}"/>
+              </a:ext>
+            </a:extLst>
+          </p:cNvPr>
+          <p:cNvSpPr>
+            <a:spLocks noGrp="1"/>
+          </p:cNvSpPr>
+          <p:nvPr>
+            <p:ph idx="1"/>
+          </p:nvPr>
+        </p:nvSpPr>
+        <p:spPr/>
+        <p:txBody>
+          <a:bodyPr>
+            <a:normAutofit/>
+          </a:bodyPr>
+          <a:lstStyle/>
+          <a:p>
+            <a:r>
+              <a:rPr lang="en-US" dirty="0"/>
+              <a:t>Security</a:t>
+            </a:r>
+          </a:p>
+          <a:p>
+            <a:pPr lvl="1"/>
+            <a:r>
+              <a:rPr lang="en-US" dirty="0"/>
+              <a:t>Removed many protocols no longer considered secure</a:t>
+            </a:r>
+          </a:p>
+          <a:p>
+            <a:pPr lvl="1"/>
+            <a:r>
+              <a:rPr lang="en-US" dirty="0"/>
+              <a:t>Allows only ephemeral DH or ECDH for key exchange (no RSA)</a:t>
+            </a:r>
+          </a:p>
+          <a:p>
+            <a:r>
+              <a:rPr lang="en-US" dirty="0"/>
+              <a:t>Speed</a:t>
+            </a:r>
+          </a:p>
+          <a:p>
+            <a:pPr lvl="1"/>
+            <a:r>
+              <a:rPr lang="en-US" dirty="0"/>
+              <a:t>Reduced handshake from two round trips in TLS 1.2 to one round trip in TLS 1.3</a:t>
+            </a:r>
+          </a:p>
+          <a:p>
+            <a:pPr lvl="1"/>
+            <a:r>
+              <a:rPr lang="en-US" dirty="0"/>
+              <a:t>Abbreviated handshake to resume previously established connections</a:t>
+            </a:r>
+          </a:p>
+          <a:p>
+            <a:r>
+              <a:rPr lang="en-US" dirty="0"/>
+              <a:t>Server certificate moved to encrypted portion of handshake</a:t>
+            </a:r>
+          </a:p>
+          <a:p>
+            <a:pPr lvl="1"/>
+            <a:r>
+              <a:rPr lang="en-US" dirty="0"/>
+              <a:t>Intrusion Detection/Prevention Systems (IDS/IPS) can no longer monitor server cert without special methods (MITM)</a:t>
+            </a:r>
+          </a:p>
+        </p:txBody>
+      </p:sp>
+    </p:spTree>
+    <p:extLst>
+      <p:ext uri="{BB962C8B-B14F-4D97-AF65-F5344CB8AC3E}">
+        <p14:creationId xmlns:p14="http://schemas.microsoft.com/office/powerpoint/2010/main" val="3587650072"/>
+      </p:ext>
+    </p:extLst>
+  </p:cSld>
+  <p:clrMapOvr>
+    <a:masterClrMapping/>
+  </p:clrMapOvr>
+</p:sld>
+</file>
+
+<file path=ppt/slides/slide17.xml><?xml version="1.0" encoding="utf-8"?>
+<p:sld xmlns:a="http://schemas.openxmlformats.org/drawingml/2006/main" xmlns:r="http://schemas.openxmlformats.org/officeDocument/2006/relationships" xmlns:p="http://schemas.openxmlformats.org/presentationml/2006/main">
+  <p:cSld>
+    <p:spTree>
+      <p:nvGrpSpPr>
+        <p:cNvPr id="1" name=""/>
+        <p:cNvGrpSpPr/>
+        <p:nvPr/>
+      </p:nvGrpSpPr>
+      <p:grpSpPr>
+        <a:xfrm>
+          <a:off x="0" y="0"/>
+          <a:ext cx="0" cy="0"/>
+          <a:chOff x="0" y="0"/>
+          <a:chExt cx="0" cy="0"/>
+        </a:xfrm>
+      </p:grpSpPr>
+      <p:sp>
+        <p:nvSpPr>
+          <p:cNvPr id="2" name="Title 1">
+            <a:extLst>
+              <a:ext uri="{FF2B5EF4-FFF2-40B4-BE49-F238E27FC236}">
                 <a16:creationId xmlns:a16="http://schemas.microsoft.com/office/drawing/2014/main" id="{814E8104-8C1C-4BF4-9424-7C07D304F36E}"/>
               </a:ext>
             </a:extLst>
@@ -6279,7 +6461,7 @@
             <a:pPr lvl="1"/>
             <a:r>
               <a:rPr lang="en-US" dirty="0"/>
-              <a:t>After channel is created, symmetric key is chosen</a:t>
+              <a:t>Session key changes, but Private and Public keys do not change</a:t>
             </a:r>
           </a:p>
           <a:p>
@@ -6328,15 +6510,7 @@
           <a:p>
             <a:r>
               <a:rPr lang="en-US" dirty="0"/>
-              <a:t>With DH, the entire key is not in the traffic, so </a:t>
-            </a:r>
-            <a:r>
-              <a:rPr lang="en-US"/>
-              <a:t>stored traffic cannot </a:t>
-            </a:r>
-            <a:r>
-              <a:rPr lang="en-US" dirty="0"/>
-              <a:t>be decrypted</a:t>
+              <a:t>With DH, the entire key is not in the traffic, so stored traffic cannot be decrypted</a:t>
             </a:r>
           </a:p>
           <a:p>
@@ -6479,6 +6653,58 @@
           </a:prstGeom>
         </p:spPr>
       </p:pic>
+      <p:sp>
+        <p:nvSpPr>
+          <p:cNvPr id="3" name="Rectangle 2">
+            <a:extLst>
+              <a:ext uri="{FF2B5EF4-FFF2-40B4-BE49-F238E27FC236}">
+                <a16:creationId xmlns:a16="http://schemas.microsoft.com/office/drawing/2014/main" id="{405FD559-8F20-59A8-9C41-60F3B6651FB5}"/>
+              </a:ext>
+            </a:extLst>
+          </p:cNvPr>
+          <p:cNvSpPr/>
+          <p:nvPr/>
+        </p:nvSpPr>
+        <p:spPr>
+          <a:xfrm>
+            <a:off x="1147350" y="1828799"/>
+            <a:ext cx="1621976" cy="418011"/>
+          </a:xfrm>
+          <a:prstGeom prst="rect">
+            <a:avLst/>
+          </a:prstGeom>
+          <a:noFill/>
+          <a:ln w="38100">
+            <a:solidFill>
+              <a:srgbClr val="FF0000"/>
+            </a:solidFill>
+          </a:ln>
+        </p:spPr>
+        <p:style>
+          <a:lnRef idx="2">
+            <a:schemeClr val="accent1">
+              <a:shade val="15000"/>
+            </a:schemeClr>
+          </a:lnRef>
+          <a:fillRef idx="1">
+            <a:schemeClr val="accent1"/>
+          </a:fillRef>
+          <a:effectRef idx="0">
+            <a:schemeClr val="accent1"/>
+          </a:effectRef>
+          <a:fontRef idx="minor">
+            <a:schemeClr val="lt1"/>
+          </a:fontRef>
+        </p:style>
+        <p:txBody>
+          <a:bodyPr rtlCol="0" anchor="ctr"/>
+          <a:lstStyle/>
+          <a:p>
+            <a:pPr algn="ctr"/>
+            <a:endParaRPr lang="en-US"/>
+          </a:p>
+        </p:txBody>
+      </p:sp>
     </p:spTree>
     <p:extLst>
       <p:ext uri="{BB962C8B-B14F-4D97-AF65-F5344CB8AC3E}">
@@ -6740,7 +6966,7 @@
           <a:p>
             <a:r>
               <a:rPr lang="en-US" dirty="0"/>
-              <a:t>Current browsers use TLS 1.2, beginning to move to TLS 1.3</a:t>
+              <a:t>Current browsers use TLS 1.3, although TLS 1.2 is still available</a:t>
             </a:r>
           </a:p>
           <a:p>
@@ -6753,13 +6979,8 @@
           <a:p>
             <a:r>
               <a:rPr lang="en-US" dirty="0"/>
-              <a:t>TLS is a suite of several protocols, with </a:t>
-            </a:r>
-            <a:r>
-              <a:rPr lang="en-US"/>
-              <a:t>different purposes</a:t>
-            </a:r>
-            <a:endParaRPr lang="en-US" dirty="0"/>
+              <a:t>TLS is a suite of several protocols, with different purposes</a:t>
+            </a:r>
           </a:p>
           <a:p>
             <a:pPr lvl="1"/>
@@ -6871,7 +7092,7 @@
           <a:p>
             <a:r>
               <a:rPr lang="en-US" dirty="0"/>
-              <a:t>Some Virtual Private Network (VPN) clients are built on TLS</a:t>
+              <a:t>Many Virtual Private Network (VPN) clients are built on TLS</a:t>
             </a:r>
           </a:p>
           <a:p>
@@ -6890,13 +7111,8 @@
           <a:p>
             <a:r>
               <a:rPr lang="en-US" dirty="0"/>
-              <a:t>Messages </a:t>
-            </a:r>
-            <a:r>
-              <a:rPr lang="en-US"/>
-              <a:t>between email servers (SMTP) can use TLS (STARTTLS)</a:t>
-            </a:r>
-            <a:endParaRPr lang="en-US" dirty="0"/>
+              <a:t>Messages between email servers (SMTP) can use TLS (STARTTLS)</a:t>
+            </a:r>
           </a:p>
           <a:p>
             <a:r>
@@ -6983,7 +7199,7 @@
         <p:spPr/>
         <p:txBody>
           <a:bodyPr>
-            <a:normAutofit fontScale="92500"/>
+            <a:normAutofit fontScale="92500" lnSpcReduction="10000"/>
           </a:bodyPr>
           <a:lstStyle/>
           <a:p>
@@ -7084,18 +7300,10 @@
             </a:r>
           </a:p>
           <a:p>
-            <a:pPr marL="457200" lvl="1" indent="0">
-              <a:buNone/>
-            </a:pPr>
-            <a:r>
-              <a:rPr lang="en-US" dirty="0">
-                <a:hlinkClick r:id="rId3"/>
-              </a:rPr>
-              <a:t>https://www.youtube.com/watch?v=86cQJ0MMses</a:t>
-            </a:r>
-            <a:r>
-              <a:rPr lang="en-US" dirty="0"/>
-              <a:t> </a:t>
+            <a:pPr lvl="1"/>
+            <a:r>
+              <a:rPr lang="en-US" dirty="0"/>
+              <a:t>Finished/Encrypted Handshake message.  Contains encrypted hash of all previous info to prevent attacks</a:t>
             </a:r>
           </a:p>
         </p:txBody>
@@ -7130,137 +7338,170 @@
           <a:chExt cx="0" cy="0"/>
         </a:xfrm>
       </p:grpSpPr>
-      <p:sp>
-        <p:nvSpPr>
-          <p:cNvPr id="2" name="Title 1">
-            <a:extLst>
-              <a:ext uri="{FF2B5EF4-FFF2-40B4-BE49-F238E27FC236}">
-                <a16:creationId xmlns:a16="http://schemas.microsoft.com/office/drawing/2014/main" id="{9DBFA4E6-F6E2-4F2D-8577-65ADAEB1F037}"/>
-              </a:ext>
-            </a:extLst>
-          </p:cNvPr>
-          <p:cNvSpPr>
-            <a:spLocks noGrp="1"/>
-          </p:cNvSpPr>
-          <p:nvPr>
-            <p:ph type="title"/>
-          </p:nvPr>
-        </p:nvSpPr>
-        <p:spPr/>
-        <p:txBody>
-          <a:bodyPr/>
-          <a:lstStyle/>
-          <a:p>
-            <a:r>
-              <a:rPr lang="en-US" dirty="0"/>
-              <a:t>TLS Cipher Suites</a:t>
-            </a:r>
-          </a:p>
-        </p:txBody>
-      </p:sp>
-      <p:sp>
-        <p:nvSpPr>
-          <p:cNvPr id="3" name="Content Placeholder 2">
-            <a:extLst>
-              <a:ext uri="{FF2B5EF4-FFF2-40B4-BE49-F238E27FC236}">
-                <a16:creationId xmlns:a16="http://schemas.microsoft.com/office/drawing/2014/main" id="{05B973A4-05D0-4DBA-8F0E-1AF46A435186}"/>
-              </a:ext>
-            </a:extLst>
-          </p:cNvPr>
-          <p:cNvSpPr>
-            <a:spLocks noGrp="1"/>
-          </p:cNvSpPr>
-          <p:nvPr>
-            <p:ph idx="1"/>
-          </p:nvPr>
-        </p:nvSpPr>
-        <p:spPr/>
-        <p:txBody>
-          <a:bodyPr>
-            <a:normAutofit fontScale="92500" lnSpcReduction="10000"/>
+      <p:pic>
+        <p:nvPicPr>
+          <p:cNvPr id="5" name="Picture 4">
+            <a:extLst>
+              <a:ext uri="{FF2B5EF4-FFF2-40B4-BE49-F238E27FC236}">
+                <a16:creationId xmlns:a16="http://schemas.microsoft.com/office/drawing/2014/main" id="{22B41FD6-C494-934F-29C9-F3748C6C1C5A}"/>
+              </a:ext>
+            </a:extLst>
+          </p:cNvPr>
+          <p:cNvPicPr>
+            <a:picLocks noChangeAspect="1"/>
+          </p:cNvPicPr>
+          <p:nvPr/>
+        </p:nvPicPr>
+        <p:blipFill>
+          <a:blip r:embed="rId2"/>
+          <a:stretch>
+            <a:fillRect/>
+          </a:stretch>
+        </p:blipFill>
+        <p:spPr>
+          <a:xfrm>
+            <a:off x="1385230" y="137653"/>
+            <a:ext cx="9421540" cy="6582694"/>
+          </a:xfrm>
+          <a:prstGeom prst="rect">
+            <a:avLst/>
+          </a:prstGeom>
+        </p:spPr>
+      </p:pic>
+      <p:sp>
+        <p:nvSpPr>
+          <p:cNvPr id="6" name="TextBox 5">
+            <a:extLst>
+              <a:ext uri="{FF2B5EF4-FFF2-40B4-BE49-F238E27FC236}">
+                <a16:creationId xmlns:a16="http://schemas.microsoft.com/office/drawing/2014/main" id="{981A535D-BC76-8F9A-4DC6-0E9F9A244A42}"/>
+              </a:ext>
+            </a:extLst>
+          </p:cNvPr>
+          <p:cNvSpPr txBox="1"/>
+          <p:nvPr/>
+        </p:nvSpPr>
+        <p:spPr>
+          <a:xfrm>
+            <a:off x="1385229" y="2899954"/>
+            <a:ext cx="3931353" cy="861774"/>
+          </a:xfrm>
+          <a:prstGeom prst="rect">
+            <a:avLst/>
+          </a:prstGeom>
+          <a:noFill/>
+        </p:spPr>
+        <p:txBody>
+          <a:bodyPr wrap="square" rtlCol="0">
+            <a:spAutoFit/>
           </a:bodyPr>
           <a:lstStyle/>
           <a:p>
             <a:r>
               <a:rPr lang="en-US" dirty="0"/>
-              <a:t>Different functions need different cipher protocols</a:t>
-            </a:r>
-          </a:p>
-          <a:p>
-            <a:r>
-              <a:rPr lang="en-US" dirty="0"/>
-              <a:t>Key Exchange</a:t>
-            </a:r>
-          </a:p>
-          <a:p>
-            <a:pPr lvl="1"/>
-            <a:r>
-              <a:rPr lang="en-US" dirty="0"/>
-              <a:t>Usually Diffie-Hellman (DH), Elliptic Curve DH (ECDH), </a:t>
-            </a:r>
-            <a:r>
-              <a:rPr lang="en-US" strike="sngStrike" dirty="0"/>
-              <a:t>or RSA</a:t>
-            </a:r>
-          </a:p>
-          <a:p>
-            <a:r>
-              <a:rPr lang="en-US" dirty="0"/>
-              <a:t>Digital certificates</a:t>
-            </a:r>
-          </a:p>
-          <a:p>
-            <a:pPr lvl="1"/>
-            <a:r>
-              <a:rPr lang="en-US" dirty="0"/>
-              <a:t>Most often RSA, also DSA and ECDSA, must use SHA-256 or better as hash</a:t>
-            </a:r>
-          </a:p>
-          <a:p>
-            <a:r>
-              <a:rPr lang="en-US" dirty="0"/>
-              <a:t>Symmetric Block Cipher (primary data exchange)</a:t>
-            </a:r>
-          </a:p>
-          <a:p>
-            <a:pPr lvl="1"/>
-            <a:r>
-              <a:rPr lang="en-US" dirty="0"/>
-              <a:t>AES-GCM (AES in Galois Counter Mode) is common</a:t>
-            </a:r>
-          </a:p>
-          <a:p>
-            <a:r>
-              <a:rPr lang="en-US" dirty="0"/>
-              <a:t>Hash Method</a:t>
-            </a:r>
-          </a:p>
-          <a:p>
-            <a:pPr lvl="1"/>
-            <a:r>
-              <a:rPr lang="en-US" dirty="0"/>
-              <a:t>often SHA-256 or better</a:t>
-            </a:r>
-          </a:p>
-          <a:p>
-            <a:r>
-              <a:rPr lang="en-US" dirty="0"/>
-              <a:t>Data Integrity (Message Authentication Code (MAC))</a:t>
-            </a:r>
-          </a:p>
-          <a:p>
-            <a:pPr lvl="1"/>
-            <a:r>
-              <a:rPr lang="en-US" dirty="0"/>
-              <a:t>HMAC or AEAD</a:t>
-            </a:r>
-          </a:p>
-        </p:txBody>
-      </p:sp>
+              <a:t>From TLS Handshake video by Dr. Mike Pound </a:t>
+            </a:r>
+            <a:r>
+              <a:rPr lang="en-US" sz="1400" dirty="0">
+                <a:hlinkClick r:id="rId3"/>
+              </a:rPr>
+              <a:t>https://www.youtube.com/watch?v=86cQJ0MMses</a:t>
+            </a:r>
+            <a:r>
+              <a:rPr lang="en-US" sz="1400" dirty="0"/>
+              <a:t> </a:t>
+            </a:r>
+            <a:endParaRPr lang="en-US" dirty="0"/>
+          </a:p>
+        </p:txBody>
+      </p:sp>
+      <p:sp>
+        <p:nvSpPr>
+          <p:cNvPr id="7" name="Rectangle 6">
+            <a:extLst>
+              <a:ext uri="{FF2B5EF4-FFF2-40B4-BE49-F238E27FC236}">
+                <a16:creationId xmlns:a16="http://schemas.microsoft.com/office/drawing/2014/main" id="{4C70F1B3-12F7-255F-BDF7-5A4698772309}"/>
+              </a:ext>
+            </a:extLst>
+          </p:cNvPr>
+          <p:cNvSpPr/>
+          <p:nvPr/>
+        </p:nvSpPr>
+        <p:spPr>
+          <a:xfrm>
+            <a:off x="5133703" y="137653"/>
+            <a:ext cx="2651760" cy="437113"/>
+          </a:xfrm>
+          <a:prstGeom prst="rect">
+            <a:avLst/>
+          </a:prstGeom>
+          <a:solidFill>
+            <a:schemeClr val="bg2"/>
+          </a:solidFill>
+          <a:ln>
+            <a:solidFill>
+              <a:schemeClr val="bg1"/>
+            </a:solidFill>
+          </a:ln>
+        </p:spPr>
+        <p:style>
+          <a:lnRef idx="2">
+            <a:schemeClr val="accent1">
+              <a:shade val="15000"/>
+            </a:schemeClr>
+          </a:lnRef>
+          <a:fillRef idx="1">
+            <a:schemeClr val="accent1"/>
+          </a:fillRef>
+          <a:effectRef idx="0">
+            <a:schemeClr val="accent1"/>
+          </a:effectRef>
+          <a:fontRef idx="minor">
+            <a:schemeClr val="lt1"/>
+          </a:fontRef>
+        </p:style>
+        <p:txBody>
+          <a:bodyPr rtlCol="0" anchor="ctr"/>
+          <a:lstStyle/>
+          <a:p>
+            <a:pPr algn="ctr"/>
+            <a:endParaRPr lang="en-US"/>
+          </a:p>
+        </p:txBody>
+      </p:sp>
+      <p:pic>
+        <p:nvPicPr>
+          <p:cNvPr id="9" name="Picture 8">
+            <a:extLst>
+              <a:ext uri="{FF2B5EF4-FFF2-40B4-BE49-F238E27FC236}">
+                <a16:creationId xmlns:a16="http://schemas.microsoft.com/office/drawing/2014/main" id="{2A022901-4C08-93F7-4776-6DE6F9262C7E}"/>
+              </a:ext>
+            </a:extLst>
+          </p:cNvPr>
+          <p:cNvPicPr>
+            <a:picLocks noChangeAspect="1"/>
+          </p:cNvPicPr>
+          <p:nvPr/>
+        </p:nvPicPr>
+        <p:blipFill>
+          <a:blip r:embed="rId4"/>
+          <a:stretch>
+            <a:fillRect/>
+          </a:stretch>
+        </p:blipFill>
+        <p:spPr>
+          <a:xfrm>
+            <a:off x="8627167" y="1500969"/>
+            <a:ext cx="615957" cy="628277"/>
+          </a:xfrm>
+          <a:prstGeom prst="rect">
+            <a:avLst/>
+          </a:prstGeom>
+        </p:spPr>
+      </p:pic>
     </p:spTree>
     <p:extLst>
       <p:ext uri="{BB962C8B-B14F-4D97-AF65-F5344CB8AC3E}">
-        <p14:creationId xmlns:p14="http://schemas.microsoft.com/office/powerpoint/2010/main" val="648061262"/>
+        <p14:creationId xmlns:p14="http://schemas.microsoft.com/office/powerpoint/2010/main" val="3182229627"/>
       </p:ext>
     </p:extLst>
   </p:cSld>
@@ -7292,7 +7533,7 @@
           <p:cNvPr id="2" name="Title 1">
             <a:extLst>
               <a:ext uri="{FF2B5EF4-FFF2-40B4-BE49-F238E27FC236}">
-                <a16:creationId xmlns:a16="http://schemas.microsoft.com/office/drawing/2014/main" id="{0D6BE665-728B-4FB9-944C-D65338999C04}"/>
+                <a16:creationId xmlns:a16="http://schemas.microsoft.com/office/drawing/2014/main" id="{9DBFA4E6-F6E2-4F2D-8577-65ADAEB1F037}"/>
               </a:ext>
             </a:extLst>
           </p:cNvPr>
@@ -7310,7 +7551,7 @@
           <a:p>
             <a:r>
               <a:rPr lang="en-US" dirty="0"/>
-              <a:t>TLS example—Client Hello</a:t>
+              <a:t>TLS Cipher Suites</a:t>
             </a:r>
           </a:p>
         </p:txBody>
@@ -7320,7 +7561,7 @@
           <p:cNvPr id="3" name="Content Placeholder 2">
             <a:extLst>
               <a:ext uri="{FF2B5EF4-FFF2-40B4-BE49-F238E27FC236}">
-                <a16:creationId xmlns:a16="http://schemas.microsoft.com/office/drawing/2014/main" id="{23C58555-4A3B-45C6-A352-89EAB1648DDE}"/>
+                <a16:creationId xmlns:a16="http://schemas.microsoft.com/office/drawing/2014/main" id="{05B973A4-05D0-4DBA-8F0E-1AF46A435186}"/>
               </a:ext>
             </a:extLst>
           </p:cNvPr>
@@ -7331,57 +7572,97 @@
             <p:ph idx="1"/>
           </p:nvPr>
         </p:nvSpPr>
-        <p:spPr>
-          <a:xfrm>
-            <a:off x="838200" y="5167312"/>
-            <a:ext cx="4323608" cy="605643"/>
-          </a:xfrm>
-        </p:spPr>
-        <p:txBody>
-          <a:bodyPr/>
-          <a:lstStyle/>
-          <a:p>
-            <a:r>
-              <a:rPr lang="en-US" dirty="0"/>
-              <a:t>Client lists Cipher Suites</a:t>
-            </a:r>
-          </a:p>
-        </p:txBody>
-      </p:sp>
-      <p:pic>
-        <p:nvPicPr>
-          <p:cNvPr id="6" name="Picture 5">
-            <a:extLst>
-              <a:ext uri="{FF2B5EF4-FFF2-40B4-BE49-F238E27FC236}">
-                <a16:creationId xmlns:a16="http://schemas.microsoft.com/office/drawing/2014/main" id="{50AC3AD2-33F7-4AE7-AC9D-AFE6A0ECC0C7}"/>
-              </a:ext>
-            </a:extLst>
-          </p:cNvPr>
-          <p:cNvPicPr>
-            <a:picLocks noChangeAspect="1"/>
-          </p:cNvPicPr>
-          <p:nvPr/>
-        </p:nvPicPr>
-        <p:blipFill>
-          <a:blip r:embed="rId3"/>
-          <a:stretch>
-            <a:fillRect/>
-          </a:stretch>
-        </p:blipFill>
-        <p:spPr>
-          <a:xfrm>
-            <a:off x="1178242" y="1690688"/>
-            <a:ext cx="9629775" cy="3057525"/>
-          </a:xfrm>
-          <a:prstGeom prst="rect">
-            <a:avLst/>
-          </a:prstGeom>
-        </p:spPr>
-      </p:pic>
+        <p:spPr/>
+        <p:txBody>
+          <a:bodyPr>
+            <a:normAutofit fontScale="92500" lnSpcReduction="10000"/>
+          </a:bodyPr>
+          <a:lstStyle/>
+          <a:p>
+            <a:r>
+              <a:rPr lang="en-US" dirty="0"/>
+              <a:t>Different functions need different cipher protocols</a:t>
+            </a:r>
+          </a:p>
+          <a:p>
+            <a:r>
+              <a:rPr lang="en-US" dirty="0"/>
+              <a:t>Key Exchange</a:t>
+            </a:r>
+          </a:p>
+          <a:p>
+            <a:pPr lvl="1"/>
+            <a:r>
+              <a:rPr lang="en-US" dirty="0"/>
+              <a:t>Usually Diffie-Hellman (DH), Elliptic Curve DH (ECDH), </a:t>
+            </a:r>
+            <a:r>
+              <a:rPr lang="en-US" strike="sngStrike" dirty="0"/>
+              <a:t>or RSA </a:t>
+            </a:r>
+            <a:r>
+              <a:rPr lang="en-US" dirty="0"/>
+              <a:t>(removed in TLS 1.3)</a:t>
+            </a:r>
+          </a:p>
+          <a:p>
+            <a:r>
+              <a:rPr lang="en-US" dirty="0"/>
+              <a:t>Digital certificate/Authentication</a:t>
+            </a:r>
+          </a:p>
+          <a:p>
+            <a:pPr lvl="1"/>
+            <a:r>
+              <a:rPr lang="en-US" dirty="0"/>
+              <a:t>Most often RSA, also DSA and ECDSA, must use SHA-256 or better as hash</a:t>
+            </a:r>
+          </a:p>
+          <a:p>
+            <a:r>
+              <a:rPr lang="en-US" dirty="0"/>
+              <a:t>Symmetric Block Cipher (primary data exchange)</a:t>
+            </a:r>
+          </a:p>
+          <a:p>
+            <a:pPr lvl="1"/>
+            <a:r>
+              <a:rPr lang="en-US" dirty="0"/>
+              <a:t>AES-GCM (AES in Galois Counter Mode) GCM includes a tag/MAC</a:t>
+            </a:r>
+          </a:p>
+          <a:p>
+            <a:r>
+              <a:rPr lang="en-US" dirty="0"/>
+              <a:t>Hash Method</a:t>
+            </a:r>
+          </a:p>
+          <a:p>
+            <a:pPr lvl="1"/>
+            <a:r>
+              <a:rPr lang="en-US" dirty="0"/>
+              <a:t>often SHA-256 or better</a:t>
+            </a:r>
+          </a:p>
+          <a:p>
+            <a:r>
+              <a:rPr lang="en-US" dirty="0"/>
+              <a:t>Data Integrity (Message Authentication Code (MAC))</a:t>
+            </a:r>
+          </a:p>
+          <a:p>
+            <a:pPr lvl="1"/>
+            <a:r>
+              <a:rPr lang="en-US" dirty="0"/>
+              <a:t>HMAC or AEAD (may be built into the cipher, as in AES-GCM</a:t>
+            </a:r>
+          </a:p>
+        </p:txBody>
+      </p:sp>
     </p:spTree>
     <p:extLst>
       <p:ext uri="{BB962C8B-B14F-4D97-AF65-F5344CB8AC3E}">
-        <p14:creationId xmlns:p14="http://schemas.microsoft.com/office/powerpoint/2010/main" val="662210425"/>
+        <p14:creationId xmlns:p14="http://schemas.microsoft.com/office/powerpoint/2010/main" val="648061262"/>
       </p:ext>
     </p:extLst>
   </p:cSld>
@@ -7413,7 +7694,7 @@
           <p:cNvPr id="2" name="Title 1">
             <a:extLst>
               <a:ext uri="{FF2B5EF4-FFF2-40B4-BE49-F238E27FC236}">
-                <a16:creationId xmlns:a16="http://schemas.microsoft.com/office/drawing/2014/main" id="{97EF0793-1FC4-4FB5-9C9C-8766CE03D148}"/>
+                <a16:creationId xmlns:a16="http://schemas.microsoft.com/office/drawing/2014/main" id="{0D6BE665-728B-4FB9-944C-D65338999C04}"/>
               </a:ext>
             </a:extLst>
           </p:cNvPr>
@@ -7431,17 +7712,65 @@
           <a:p>
             <a:r>
               <a:rPr lang="en-US" dirty="0"/>
-              <a:t>TLS example—Server Hello</a:t>
+              <a:t>TLS example—Client Hello</a:t>
+            </a:r>
+          </a:p>
+        </p:txBody>
+      </p:sp>
+      <p:sp>
+        <p:nvSpPr>
+          <p:cNvPr id="3" name="Content Placeholder 2">
+            <a:extLst>
+              <a:ext uri="{FF2B5EF4-FFF2-40B4-BE49-F238E27FC236}">
+                <a16:creationId xmlns:a16="http://schemas.microsoft.com/office/drawing/2014/main" id="{23C58555-4A3B-45C6-A352-89EAB1648DDE}"/>
+              </a:ext>
+            </a:extLst>
+          </p:cNvPr>
+          <p:cNvSpPr>
+            <a:spLocks noGrp="1"/>
+          </p:cNvSpPr>
+          <p:nvPr>
+            <p:ph idx="1"/>
+          </p:nvPr>
+        </p:nvSpPr>
+        <p:spPr>
+          <a:xfrm>
+            <a:off x="838199" y="4924697"/>
+            <a:ext cx="9969817" cy="1436914"/>
+          </a:xfrm>
+        </p:spPr>
+        <p:txBody>
+          <a:bodyPr>
+            <a:normAutofit/>
+          </a:bodyPr>
+          <a:lstStyle/>
+          <a:p>
+            <a:r>
+              <a:rPr lang="en-US" dirty="0"/>
+              <a:t>Client lists Cipher Suites</a:t>
+            </a:r>
+          </a:p>
+          <a:p>
+            <a:r>
+              <a:rPr lang="en-US" dirty="0"/>
+              <a:t>Includes a random number so key material is always different</a:t>
+            </a:r>
+          </a:p>
+          <a:p>
+            <a:pPr lvl="1"/>
+            <a:r>
+              <a:rPr lang="en-US" dirty="0"/>
+              <a:t>Think nonce or IV</a:t>
             </a:r>
           </a:p>
         </p:txBody>
       </p:sp>
       <p:pic>
         <p:nvPicPr>
-          <p:cNvPr id="4" name="Picture 3">
-            <a:extLst>
-              <a:ext uri="{FF2B5EF4-FFF2-40B4-BE49-F238E27FC236}">
-                <a16:creationId xmlns:a16="http://schemas.microsoft.com/office/drawing/2014/main" id="{2005AD58-CB67-4473-A0E2-2C49C7E38D92}"/>
+          <p:cNvPr id="6" name="Picture 5">
+            <a:extLst>
+              <a:ext uri="{FF2B5EF4-FFF2-40B4-BE49-F238E27FC236}">
+                <a16:creationId xmlns:a16="http://schemas.microsoft.com/office/drawing/2014/main" id="{50AC3AD2-33F7-4AE7-AC9D-AFE6A0ECC0C7}"/>
               </a:ext>
             </a:extLst>
           </p:cNvPr>
@@ -7458,51 +7787,18 @@
         </p:blipFill>
         <p:spPr>
           <a:xfrm>
-            <a:off x="681099" y="1502105"/>
-            <a:ext cx="8953500" cy="4210050"/>
+            <a:off x="1178242" y="1690688"/>
+            <a:ext cx="9629775" cy="3057525"/>
           </a:xfrm>
           <a:prstGeom prst="rect">
             <a:avLst/>
           </a:prstGeom>
         </p:spPr>
       </p:pic>
-      <p:sp>
-        <p:nvSpPr>
-          <p:cNvPr id="3" name="Content Placeholder 2">
-            <a:extLst>
-              <a:ext uri="{FF2B5EF4-FFF2-40B4-BE49-F238E27FC236}">
-                <a16:creationId xmlns:a16="http://schemas.microsoft.com/office/drawing/2014/main" id="{27B328AF-6BB4-495A-B113-ABE22E3E41E6}"/>
-              </a:ext>
-            </a:extLst>
-          </p:cNvPr>
-          <p:cNvSpPr>
-            <a:spLocks noGrp="1"/>
-          </p:cNvSpPr>
-          <p:nvPr>
-            <p:ph idx="1"/>
-          </p:nvPr>
-        </p:nvSpPr>
-        <p:spPr>
-          <a:xfrm>
-            <a:off x="7528955" y="3834059"/>
-            <a:ext cx="3824845" cy="1521836"/>
-          </a:xfrm>
-        </p:spPr>
-        <p:txBody>
-          <a:bodyPr/>
-          <a:lstStyle/>
-          <a:p>
-            <a:r>
-              <a:rPr lang="en-US" dirty="0"/>
-              <a:t>Server selects Cipher Suite</a:t>
-            </a:r>
-          </a:p>
-        </p:txBody>
-      </p:sp>
     </p:spTree>
     <p:extLst>
       <p:ext uri="{BB962C8B-B14F-4D97-AF65-F5344CB8AC3E}">
-        <p14:creationId xmlns:p14="http://schemas.microsoft.com/office/powerpoint/2010/main" val="4279263951"/>
+        <p14:creationId xmlns:p14="http://schemas.microsoft.com/office/powerpoint/2010/main" val="662210425"/>
       </p:ext>
     </p:extLst>
   </p:cSld>

</xml_diff>